<commit_message>
LAPR4 TP Class PowerPoint Improvement
</commit_message>
<xml_diff>
--- a/eapli.base/docs/LAPR4 2021.pptx
+++ b/eapli.base/docs/LAPR4 2021.pptx
@@ -1247,7 +1247,7 @@
             <a:pPr rtl="0"/>
             <a:fld id="{3E2371BD-CBE8-435D-9B11-549FDC16ACEF}" type="datetime1">
               <a:rPr lang="pt-PT" smtClean="0"/>
-              <a:t>08/06/2022</a:t>
+              <a:t>18/06/2022</a:t>
             </a:fld>
             <a:endParaRPr lang="pt-PT"/>
           </a:p>
@@ -1429,7 +1429,7 @@
             <a:fld id="{E8762B9F-17DB-4047-B9A9-527C0B05C166}" type="datetime1">
               <a:rPr lang="pt-PT" smtClean="0"/>
               <a:pPr/>
-              <a:t>08/06/2022</a:t>
+              <a:t>18/06/2022</a:t>
             </a:fld>
             <a:endParaRPr lang="pt-PT" dirty="0"/>
           </a:p>
@@ -2720,7 +2720,7 @@
             <a:pPr rtl="0"/>
             <a:fld id="{77DD2573-0068-4218-9697-F7C79B894BD0}" type="datetime1">
               <a:rPr lang="pt-PT" noProof="0" smtClean="0"/>
-              <a:t>08/06/2022</a:t>
+              <a:t>18/06/2022</a:t>
             </a:fld>
             <a:endParaRPr lang="pt-PT" noProof="0"/>
           </a:p>
@@ -3344,7 +3344,7 @@
             <a:pPr rtl="0"/>
             <a:fld id="{7F04794C-8A34-4F52-8567-4ACF3054A4A7}" type="datetime1">
               <a:rPr lang="pt-PT" noProof="0" smtClean="0"/>
-              <a:t>08/06/2022</a:t>
+              <a:t>18/06/2022</a:t>
             </a:fld>
             <a:endParaRPr lang="pt-PT" noProof="0"/>
           </a:p>
@@ -3699,7 +3699,7 @@
             <a:pPr rtl="0"/>
             <a:fld id="{BD164C6E-8EF5-439C-8A13-9536CEB894EF}" type="datetime1">
               <a:rPr lang="pt-PT" noProof="0" smtClean="0"/>
-              <a:t>08/06/2022</a:t>
+              <a:t>18/06/2022</a:t>
             </a:fld>
             <a:endParaRPr lang="pt-PT" noProof="0"/>
           </a:p>
@@ -4097,7 +4097,7 @@
             <a:pPr rtl="0"/>
             <a:fld id="{86E5CF56-A80A-4E49-822B-98685F016F94}" type="datetime1">
               <a:rPr lang="pt-PT" noProof="0" smtClean="0"/>
-              <a:t>08/06/2022</a:t>
+              <a:t>18/06/2022</a:t>
             </a:fld>
             <a:endParaRPr lang="pt-PT" noProof="0"/>
           </a:p>
@@ -4577,7 +4577,7 @@
             <a:pPr rtl="0"/>
             <a:fld id="{F1453DA3-6652-456F-8FAA-FC52F4714952}" type="datetime1">
               <a:rPr lang="pt-PT" noProof="0" smtClean="0"/>
-              <a:t>08/06/2022</a:t>
+              <a:t>18/06/2022</a:t>
             </a:fld>
             <a:endParaRPr lang="pt-PT" noProof="0"/>
           </a:p>
@@ -4965,7 +4965,7 @@
             <a:pPr rtl="0"/>
             <a:fld id="{8701291D-FD4A-4968-A7CD-3604266F3E73}" type="datetime1">
               <a:rPr lang="pt-PT" noProof="0" smtClean="0"/>
-              <a:t>08/06/2022</a:t>
+              <a:t>18/06/2022</a:t>
             </a:fld>
             <a:endParaRPr lang="pt-PT" noProof="0"/>
           </a:p>
@@ -5330,7 +5330,7 @@
             <a:pPr rtl="0"/>
             <a:fld id="{9300F2A1-677D-4422-AEB8-1C3F2D70A13C}" type="datetime1">
               <a:rPr lang="pt-PT" noProof="0" smtClean="0"/>
-              <a:t>08/06/2022</a:t>
+              <a:t>18/06/2022</a:t>
             </a:fld>
             <a:endParaRPr lang="pt-PT" noProof="0"/>
           </a:p>
@@ -5821,7 +5821,7 @@
             <a:pPr rtl="0"/>
             <a:fld id="{D9D1C8C9-946A-46D8-8518-8043258C379D}" type="datetime1">
               <a:rPr lang="pt-PT" noProof="0" smtClean="0"/>
-              <a:t>08/06/2022</a:t>
+              <a:t>18/06/2022</a:t>
             </a:fld>
             <a:endParaRPr lang="pt-PT" noProof="0"/>
           </a:p>
@@ -6319,7 +6319,7 @@
             <a:pPr rtl="0"/>
             <a:fld id="{06901FDC-E33C-461E-9DB1-0DFF9E51C2EC}" type="datetime1">
               <a:rPr lang="pt-PT" noProof="0" smtClean="0"/>
-              <a:t>08/06/2022</a:t>
+              <a:t>18/06/2022</a:t>
             </a:fld>
             <a:endParaRPr lang="pt-PT" noProof="0"/>
           </a:p>
@@ -6754,7 +6754,7 @@
             <a:pPr rtl="0"/>
             <a:fld id="{477F208E-2699-4E92-83D6-804CFE27C1A5}" type="datetime1">
               <a:rPr lang="pt-PT" noProof="0" smtClean="0"/>
-              <a:t>08/06/2022</a:t>
+              <a:t>18/06/2022</a:t>
             </a:fld>
             <a:endParaRPr lang="pt-PT" noProof="0"/>
           </a:p>
@@ -7009,7 +7009,7 @@
             <a:pPr rtl="0"/>
             <a:fld id="{05F39FB4-7639-4B1B-9E03-14DB6EE79FA7}" type="datetime1">
               <a:rPr lang="pt-PT" noProof="0" smtClean="0"/>
-              <a:t>08/06/2022</a:t>
+              <a:t>18/06/2022</a:t>
             </a:fld>
             <a:endParaRPr lang="pt-PT" noProof="0"/>
           </a:p>
@@ -7242,7 +7242,7 @@
             <a:pPr rtl="0"/>
             <a:fld id="{BB001E8D-7942-4BBF-BB6D-D845804C9269}" type="datetime1">
               <a:rPr lang="pt-PT" noProof="0" smtClean="0"/>
-              <a:t>08/06/2022</a:t>
+              <a:t>18/06/2022</a:t>
             </a:fld>
             <a:endParaRPr lang="pt-PT" noProof="0"/>
           </a:p>
@@ -7645,7 +7645,7 @@
             <a:pPr rtl="0"/>
             <a:fld id="{BF62C779-DC17-4EAE-B1A7-C07D628E75D2}" type="datetime1">
               <a:rPr lang="pt-PT" noProof="0" smtClean="0"/>
-              <a:t>08/06/2022</a:t>
+              <a:t>18/06/2022</a:t>
             </a:fld>
             <a:endParaRPr lang="pt-PT" noProof="0"/>
           </a:p>
@@ -7887,7 +7887,7 @@
             <a:pPr rtl="0"/>
             <a:fld id="{E170A376-EB10-4227-83F8-65942810904C}" type="datetime1">
               <a:rPr lang="pt-PT" noProof="0" smtClean="0"/>
-              <a:t>08/06/2022</a:t>
+              <a:t>18/06/2022</a:t>
             </a:fld>
             <a:endParaRPr lang="pt-PT" noProof="0"/>
           </a:p>
@@ -8087,7 +8087,7 @@
             <a:pPr rtl="0"/>
             <a:fld id="{EB717E73-6864-4ACA-BEFF-E733BC66FB99}" type="datetime1">
               <a:rPr lang="pt-PT" noProof="0" smtClean="0"/>
-              <a:t>08/06/2022</a:t>
+              <a:t>18/06/2022</a:t>
             </a:fld>
             <a:endParaRPr lang="pt-PT" noProof="0"/>
           </a:p>
@@ -8545,7 +8545,7 @@
             <a:pPr rtl="0"/>
             <a:fld id="{CCF8A43F-3AA3-49BB-8A10-13E3C795E3DD}" type="datetime1">
               <a:rPr lang="pt-PT" noProof="0" smtClean="0"/>
-              <a:t>08/06/2022</a:t>
+              <a:t>18/06/2022</a:t>
             </a:fld>
             <a:endParaRPr lang="pt-PT" noProof="0"/>
           </a:p>
@@ -9124,7 +9124,7 @@
             <a:pPr rtl="0"/>
             <a:fld id="{39CDF46A-7688-4473-8E35-A89B731FD273}" type="datetime1">
               <a:rPr lang="pt-PT" noProof="0" smtClean="0"/>
-              <a:t>08/06/2022</a:t>
+              <a:t>18/06/2022</a:t>
             </a:fld>
             <a:endParaRPr lang="pt-PT" noProof="0"/>
           </a:p>
@@ -9525,7 +9525,7 @@
             <a:pPr rtl="0"/>
             <a:fld id="{A1D0B20B-E649-4BDA-8A60-8636CBA730D3}" type="datetime1">
               <a:rPr lang="pt-PT" noProof="0" smtClean="0"/>
-              <a:t>08/06/2022</a:t>
+              <a:t>18/06/2022</a:t>
             </a:fld>
             <a:endParaRPr lang="pt-PT" noProof="0"/>
           </a:p>
@@ -9667,7 +9667,7 @@
             <a:pPr rtl="0"/>
             <a:fld id="{BE705C77-3064-4EC4-9186-DCFE3778A80C}" type="datetime1">
               <a:rPr lang="pt-PT" noProof="0" smtClean="0"/>
-              <a:t>08/06/2022</a:t>
+              <a:t>18/06/2022</a:t>
             </a:fld>
             <a:endParaRPr lang="pt-PT" noProof="0"/>
           </a:p>
@@ -9859,7 +9859,7 @@
             <a:pPr rtl="0"/>
             <a:fld id="{AB0AB030-7EA2-4B0D-8098-43E1BE45CBFC}" type="datetime1">
               <a:rPr lang="pt-PT" noProof="0" smtClean="0"/>
-              <a:t>08/06/2022</a:t>
+              <a:t>18/06/2022</a:t>
             </a:fld>
             <a:endParaRPr lang="pt-PT" noProof="0"/>
           </a:p>
@@ -10175,7 +10175,7 @@
             <a:pPr rtl="0"/>
             <a:fld id="{BEE6706B-7A7D-4271-8E2D-04DF90696319}" type="datetime1">
               <a:rPr lang="pt-PT" noProof="0" smtClean="0"/>
-              <a:t>08/06/2022</a:t>
+              <a:t>18/06/2022</a:t>
             </a:fld>
             <a:endParaRPr lang="pt-PT" noProof="0"/>
           </a:p>
@@ -14471,7 +14471,7 @@
         </p:nvSpPr>
         <p:spPr>
           <a:xfrm>
-            <a:off x="5509906" y="865523"/>
+            <a:off x="5297895" y="1033965"/>
             <a:ext cx="6072099" cy="634336"/>
           </a:xfrm>
         </p:spPr>
@@ -14538,6 +14538,187 @@
           <a:noFill/>
         </p:spPr>
       </p:pic>
+      <p:sp>
+        <p:nvSpPr>
+          <p:cNvPr id="2" name="CaixaDeTexto 1">
+            <a:extLst>
+              <a:ext uri="{FF2B5EF4-FFF2-40B4-BE49-F238E27FC236}">
+                <a16:creationId xmlns:a16="http://schemas.microsoft.com/office/drawing/2014/main" id="{9F357C61-6612-E065-619B-F1CFE39AA3FC}"/>
+              </a:ext>
+            </a:extLst>
+          </p:cNvPr>
+          <p:cNvSpPr txBox="1"/>
+          <p:nvPr/>
+        </p:nvSpPr>
+        <p:spPr>
+          <a:xfrm>
+            <a:off x="5297895" y="2153911"/>
+            <a:ext cx="6485021" cy="2154436"/>
+          </a:xfrm>
+          <a:prstGeom prst="rect">
+            <a:avLst/>
+          </a:prstGeom>
+          <a:noFill/>
+        </p:spPr>
+        <p:txBody>
+          <a:bodyPr wrap="square" rtlCol="0">
+            <a:spAutoFit/>
+          </a:bodyPr>
+          <a:lstStyle/>
+          <a:p>
+            <a:r>
+              <a:rPr lang="pt-PT" sz="2400" dirty="0"/>
+              <a:t>-</a:t>
+            </a:r>
+            <a:r>
+              <a:rPr lang="pt-PT" sz="2400" dirty="0" err="1"/>
+              <a:t>Starting</a:t>
+            </a:r>
+            <a:r>
+              <a:rPr lang="pt-PT" sz="2400" dirty="0"/>
+              <a:t> Sprints </a:t>
+            </a:r>
+            <a:r>
+              <a:rPr lang="pt-PT" sz="2400" dirty="0" err="1"/>
+              <a:t>Earlier</a:t>
+            </a:r>
+            <a:endParaRPr lang="pt-PT" sz="2400" dirty="0"/>
+          </a:p>
+          <a:p>
+            <a:r>
+              <a:rPr lang="pt-PT" sz="2400" dirty="0"/>
+              <a:t>-</a:t>
+            </a:r>
+            <a:r>
+              <a:rPr lang="pt-PT" sz="2400" dirty="0" err="1"/>
+              <a:t>Predicting</a:t>
+            </a:r>
+            <a:r>
+              <a:rPr lang="pt-PT" sz="2400" dirty="0"/>
+              <a:t> </a:t>
+            </a:r>
+            <a:r>
+              <a:rPr lang="pt-PT" sz="2400" dirty="0" err="1"/>
+              <a:t>better</a:t>
+            </a:r>
+            <a:r>
+              <a:rPr lang="pt-PT" sz="2400" dirty="0"/>
+              <a:t> </a:t>
+            </a:r>
+            <a:r>
+              <a:rPr lang="pt-PT" sz="2400" dirty="0" err="1"/>
+              <a:t>the</a:t>
+            </a:r>
+            <a:r>
+              <a:rPr lang="pt-PT" sz="2400" dirty="0"/>
+              <a:t> software Design</a:t>
+            </a:r>
+          </a:p>
+          <a:p>
+            <a:r>
+              <a:rPr lang="pt-PT" sz="2400" dirty="0"/>
+              <a:t>-</a:t>
+            </a:r>
+            <a:r>
+              <a:rPr lang="pt-PT" sz="2400" dirty="0" err="1"/>
+              <a:t>Constant</a:t>
+            </a:r>
+            <a:r>
+              <a:rPr lang="pt-PT" sz="2400" dirty="0"/>
+              <a:t> </a:t>
+            </a:r>
+            <a:r>
+              <a:rPr lang="pt-PT" sz="2400" dirty="0" err="1"/>
+              <a:t>working</a:t>
+            </a:r>
+            <a:r>
+              <a:rPr lang="pt-PT" sz="2400" dirty="0"/>
+              <a:t> time </a:t>
+            </a:r>
+            <a:r>
+              <a:rPr lang="pt-PT" sz="2400" dirty="0" err="1"/>
+              <a:t>on</a:t>
+            </a:r>
+            <a:r>
+              <a:rPr lang="pt-PT" sz="2400" dirty="0"/>
+              <a:t> </a:t>
+            </a:r>
+            <a:r>
+              <a:rPr lang="pt-PT" sz="2400" dirty="0" err="1"/>
+              <a:t>the</a:t>
+            </a:r>
+            <a:r>
+              <a:rPr lang="pt-PT" sz="2400" dirty="0"/>
+              <a:t> </a:t>
+            </a:r>
+            <a:r>
+              <a:rPr lang="pt-PT" sz="2400" dirty="0" err="1"/>
+              <a:t>day</a:t>
+            </a:r>
+            <a:endParaRPr lang="pt-PT" sz="2400" dirty="0"/>
+          </a:p>
+          <a:p>
+            <a:r>
+              <a:rPr lang="pt-PT" sz="2400" dirty="0"/>
+              <a:t>-</a:t>
+            </a:r>
+            <a:r>
+              <a:rPr lang="pt-PT" sz="2400" dirty="0" err="1"/>
+              <a:t>Having</a:t>
+            </a:r>
+            <a:r>
+              <a:rPr lang="pt-PT" sz="2400" dirty="0"/>
+              <a:t> </a:t>
+            </a:r>
+            <a:r>
+              <a:rPr lang="pt-PT" sz="2400" dirty="0" err="1"/>
+              <a:t>constant</a:t>
+            </a:r>
+            <a:r>
+              <a:rPr lang="pt-PT" sz="2400" dirty="0"/>
+              <a:t> </a:t>
+            </a:r>
+            <a:r>
+              <a:rPr lang="pt-PT" sz="2400" dirty="0" err="1"/>
+              <a:t>rest</a:t>
+            </a:r>
+            <a:r>
+              <a:rPr lang="pt-PT" sz="2400" dirty="0"/>
+              <a:t> time </a:t>
+            </a:r>
+            <a:r>
+              <a:rPr lang="pt-PT" sz="2400" dirty="0" err="1"/>
+              <a:t>through</a:t>
+            </a:r>
+            <a:r>
+              <a:rPr lang="pt-PT" sz="2400" dirty="0"/>
+              <a:t> </a:t>
+            </a:r>
+            <a:r>
+              <a:rPr lang="pt-PT" sz="2400" dirty="0" err="1"/>
+              <a:t>the</a:t>
+            </a:r>
+            <a:r>
+              <a:rPr lang="pt-PT" sz="2400" dirty="0"/>
+              <a:t> </a:t>
+            </a:r>
+            <a:r>
+              <a:rPr lang="pt-PT" sz="2400" dirty="0" err="1"/>
+              <a:t>week</a:t>
+            </a:r>
+            <a:endParaRPr lang="pt-PT" sz="2400" dirty="0"/>
+          </a:p>
+          <a:p>
+            <a:endParaRPr lang="pt-PT" sz="2000" dirty="0"/>
+          </a:p>
+          <a:p>
+            <a:r>
+              <a:rPr lang="pt-PT" dirty="0"/>
+              <a:t> </a:t>
+            </a:r>
+          </a:p>
+        </p:txBody>
+      </p:sp>
     </p:spTree>
     <p:extLst>
       <p:ext uri="{BB962C8B-B14F-4D97-AF65-F5344CB8AC3E}">
@@ -15425,6 +15606,15 @@
 </file>
 
 <file path=customXml/item1.xml><?xml version="1.0" encoding="utf-8"?>
+<p:properties xmlns:p="http://schemas.microsoft.com/office/2006/metadata/properties" xmlns:xsi="http://www.w3.org/2001/XMLSchema-instance" xmlns:pc="http://schemas.microsoft.com/office/infopath/2007/PartnerControls">
+  <documentManagement>
+    <Status xmlns="71af3243-3dd4-4a8d-8c0d-dd76da1f02a5">Not started</Status>
+    <MediaServiceKeyPoints xmlns="71af3243-3dd4-4a8d-8c0d-dd76da1f02a5" xsi:nil="true"/>
+  </documentManagement>
+</p:properties>
+</file>
+
+<file path=customXml/item2.xml><?xml version="1.0" encoding="utf-8"?>
 <ct:contentTypeSchema xmlns:ct="http://schemas.microsoft.com/office/2006/metadata/contentType" xmlns:ma="http://schemas.microsoft.com/office/2006/metadata/properties/metaAttributes" ct:_="" ma:_="" ma:contentTypeName="Document" ma:contentTypeID="0x01010079F111ED35F8CC479449609E8A0923A6" ma:contentTypeVersion="12" ma:contentTypeDescription="Create a new document." ma:contentTypeScope="" ma:versionID="fa6e671f1cd7e4d96ff9652be322dd5e">
   <xsd:schema xmlns:xsd="http://www.w3.org/2001/XMLSchema" xmlns:xs="http://www.w3.org/2001/XMLSchema" xmlns:p="http://schemas.microsoft.com/office/2006/metadata/properties" xmlns:ns2="71af3243-3dd4-4a8d-8c0d-dd76da1f02a5" xmlns:ns3="16c05727-aa75-4e4a-9b5f-8a80a1165891" targetNamespace="http://schemas.microsoft.com/office/2006/metadata/properties" ma:root="true" ma:fieldsID="4e2496f70b101db0b8013f30a071bbf7" ns2:_="" ns3:_="">
     <xsd:import namespace="71af3243-3dd4-4a8d-8c0d-dd76da1f02a5"/>
@@ -15645,15 +15835,6 @@
 </ct:contentTypeSchema>
 </file>
 
-<file path=customXml/item2.xml><?xml version="1.0" encoding="utf-8"?>
-<p:properties xmlns:p="http://schemas.microsoft.com/office/2006/metadata/properties" xmlns:xsi="http://www.w3.org/2001/XMLSchema-instance" xmlns:pc="http://schemas.microsoft.com/office/infopath/2007/PartnerControls">
-  <documentManagement>
-    <Status xmlns="71af3243-3dd4-4a8d-8c0d-dd76da1f02a5">Not started</Status>
-    <MediaServiceKeyPoints xmlns="71af3243-3dd4-4a8d-8c0d-dd76da1f02a5" xsi:nil="true"/>
-  </documentManagement>
-</p:properties>
-</file>
-
 <file path=customXml/item3.xml><?xml version="1.0" encoding="utf-8"?>
 <?mso-contentType ?>
 <FormTemplates xmlns="http://schemas.microsoft.com/sharepoint/v3/contenttype/forms">
@@ -15664,6 +15845,16 @@
 </file>
 
 <file path=customXml/itemProps1.xml><?xml version="1.0" encoding="utf-8"?>
+<ds:datastoreItem xmlns:ds="http://schemas.openxmlformats.org/officeDocument/2006/customXml" ds:itemID="{A4E879E6-8FFE-4154-8F2A-F7518B89B376}">
+  <ds:schemaRefs>
+    <ds:schemaRef ds:uri="http://schemas.microsoft.com/office/2006/metadata/properties"/>
+    <ds:schemaRef ds:uri="http://schemas.microsoft.com/office/infopath/2007/PartnerControls"/>
+    <ds:schemaRef ds:uri="71af3243-3dd4-4a8d-8c0d-dd76da1f02a5"/>
+  </ds:schemaRefs>
+</ds:datastoreItem>
+</file>
+
+<file path=customXml/itemProps2.xml><?xml version="1.0" encoding="utf-8"?>
 <ds:datastoreItem xmlns:ds="http://schemas.openxmlformats.org/officeDocument/2006/customXml" ds:itemID="{A941CA7C-A0BF-44EF-B2E5-7539C3B9B0B6}">
   <ds:schemaRefs>
     <ds:schemaRef ds:uri="http://schemas.microsoft.com/office/2006/metadata/contentType"/>
@@ -15682,16 +15873,6 @@
 </ds:datastoreItem>
 </file>
 
-<file path=customXml/itemProps2.xml><?xml version="1.0" encoding="utf-8"?>
-<ds:datastoreItem xmlns:ds="http://schemas.openxmlformats.org/officeDocument/2006/customXml" ds:itemID="{A4E879E6-8FFE-4154-8F2A-F7518B89B376}">
-  <ds:schemaRefs>
-    <ds:schemaRef ds:uri="http://schemas.microsoft.com/office/2006/metadata/properties"/>
-    <ds:schemaRef ds:uri="http://schemas.microsoft.com/office/infopath/2007/PartnerControls"/>
-    <ds:schemaRef ds:uri="71af3243-3dd4-4a8d-8c0d-dd76da1f02a5"/>
-  </ds:schemaRefs>
-</ds:datastoreItem>
-</file>
-
 <file path=customXml/itemProps3.xml><?xml version="1.0" encoding="utf-8"?>
 <ds:datastoreItem xmlns:ds="http://schemas.openxmlformats.org/officeDocument/2006/customXml" ds:itemID="{7E0A2CB4-6869-426F-8BC4-A32C90CBE263}">
   <ds:schemaRefs>

</xml_diff>